<commit_message>
Inclusion del logo en la app.
</commit_message>
<xml_diff>
--- a/mem/presentacion.pptx
+++ b/mem/presentacion.pptx
@@ -256,7 +256,7 @@
           <a:p>
             <a:fld id="{CC2DD168-CD50-4286-8441-9D660E02632E}" type="datetimeFigureOut">
               <a:rPr lang="es-ES" smtClean="0"/>
-              <a:t>27/09/2017</a:t>
+              <a:t>28/09/2017</a:t>
             </a:fld>
             <a:endParaRPr lang="es-ES" dirty="0"/>
           </a:p>
@@ -421,7 +421,7 @@
           <a:p>
             <a:fld id="{29785892-479F-4DA1-837F-2BFA7E37E9AD}" type="datetimeFigureOut">
               <a:rPr lang="es-ES" smtClean="0"/>
-              <a:t>27/09/2017</a:t>
+              <a:t>28/09/2017</a:t>
             </a:fld>
             <a:endParaRPr lang="es-ES" dirty="0"/>
           </a:p>
@@ -5018,7 +5018,7 @@
           <a:p>
             <a:fld id="{ECD19FB2-3AAB-4D03-B13A-2960828C78E3}" type="datetimeFigureOut">
               <a:rPr lang="en-US" smtClean="0"/>
-              <a:t>9/27/2017</a:t>
+              <a:t>9/28/2017</a:t>
             </a:fld>
             <a:endParaRPr lang="en-US" dirty="0"/>
           </a:p>
@@ -5384,7 +5384,7 @@
           <a:p>
             <a:fld id="{1B80C674-7DFC-42FE-B9CD-82963CDB1557}" type="datetimeFigureOut">
               <a:rPr lang="en-US" smtClean="0"/>
-              <a:t>9/27/2017</a:t>
+              <a:t>9/28/2017</a:t>
             </a:fld>
             <a:endParaRPr lang="en-US" dirty="0"/>
           </a:p>
@@ -5659,7 +5659,7 @@
           <a:p>
             <a:fld id="{2076456F-F47D-4F25-8053-2A695DA0CA7D}" type="datetimeFigureOut">
               <a:rPr lang="en-US" smtClean="0"/>
-              <a:t>9/27/2017</a:t>
+              <a:t>9/28/2017</a:t>
             </a:fld>
             <a:endParaRPr lang="en-US" dirty="0"/>
           </a:p>
@@ -6003,7 +6003,7 @@
           <a:p>
             <a:fld id="{5D6C7379-69CC-4837-9905-BEBA22830C8A}" type="datetimeFigureOut">
               <a:rPr lang="en-US" smtClean="0"/>
-              <a:t>9/27/2017</a:t>
+              <a:t>9/28/2017</a:t>
             </a:fld>
             <a:endParaRPr lang="en-US" dirty="0"/>
           </a:p>
@@ -6510,7 +6510,7 @@
           <a:p>
             <a:fld id="{49EB8B7E-8AEE-4F10-BFEE-C999AD004D36}" type="datetimeFigureOut">
               <a:rPr lang="en-US" smtClean="0"/>
-              <a:t>9/27/2017</a:t>
+              <a:t>9/28/2017</a:t>
             </a:fld>
             <a:endParaRPr lang="en-US" dirty="0"/>
           </a:p>
@@ -7139,7 +7139,7 @@
           <a:p>
             <a:fld id="{8668F3F9-58BC-440B-B37B-805B9055EF92}" type="datetimeFigureOut">
               <a:rPr lang="en-US" smtClean="0"/>
-              <a:t>9/27/2017</a:t>
+              <a:t>9/28/2017</a:t>
             </a:fld>
             <a:endParaRPr lang="en-US" dirty="0"/>
           </a:p>
@@ -8044,7 +8044,7 @@
           <a:p>
             <a:fld id="{0D5A53AF-48EA-489D-8260-9DCAB666386A}" type="datetimeFigureOut">
               <a:rPr lang="en-US" smtClean="0"/>
-              <a:t>9/27/2017</a:t>
+              <a:t>9/28/2017</a:t>
             </a:fld>
             <a:endParaRPr lang="en-US" dirty="0"/>
           </a:p>
@@ -8302,7 +8302,7 @@
           <a:p>
             <a:fld id="{0DED02AE-B9A4-47BD-AF8E-97E16144138B}" type="datetimeFigureOut">
               <a:rPr lang="en-US" smtClean="0"/>
-              <a:t>9/27/2017</a:t>
+              <a:t>9/28/2017</a:t>
             </a:fld>
             <a:endParaRPr lang="en-US" dirty="0"/>
           </a:p>
@@ -8569,7 +8569,7 @@
           <a:p>
             <a:fld id="{CF0FD78B-DB02-4362-BCDC-98A55456977C}" type="datetimeFigureOut">
               <a:rPr lang="en-US" smtClean="0"/>
-              <a:t>9/27/2017</a:t>
+              <a:t>9/28/2017</a:t>
             </a:fld>
             <a:endParaRPr lang="en-US" dirty="0"/>
           </a:p>
@@ -8833,7 +8833,7 @@
           <a:p>
             <a:fld id="{99916976-5D93-46E4-A98A-FAD63E4D0EA8}" type="datetimeFigureOut">
               <a:rPr lang="en-US" smtClean="0"/>
-              <a:t>9/27/2017</a:t>
+              <a:t>9/28/2017</a:t>
             </a:fld>
             <a:endParaRPr lang="en-US" dirty="0"/>
           </a:p>
@@ -9166,7 +9166,7 @@
           <a:p>
             <a:fld id="{0F39F4F5-F4D2-4D2A-AB60-88D37ADCB869}" type="datetimeFigureOut">
               <a:rPr lang="en-US" smtClean="0"/>
-              <a:t>9/27/2017</a:t>
+              <a:t>9/28/2017</a:t>
             </a:fld>
             <a:endParaRPr lang="en-US" dirty="0"/>
           </a:p>
@@ -9486,7 +9486,7 @@
           <a:p>
             <a:fld id="{D23BC6CE-6D1E-47E5-8859-F31AC5380EB2}" type="datetimeFigureOut">
               <a:rPr lang="en-US" smtClean="0"/>
-              <a:t>9/27/2017</a:t>
+              <a:t>9/28/2017</a:t>
             </a:fld>
             <a:endParaRPr lang="en-US" dirty="0"/>
           </a:p>
@@ -9954,7 +9954,7 @@
           <a:p>
             <a:fld id="{B1B4E7C4-4DA4-404D-9965-B13F2DD7D8BF}" type="datetimeFigureOut">
               <a:rPr lang="en-US" smtClean="0"/>
-              <a:t>9/27/2017</a:t>
+              <a:t>9/28/2017</a:t>
             </a:fld>
             <a:endParaRPr lang="en-US" dirty="0"/>
           </a:p>
@@ -10155,7 +10155,7 @@
           <a:p>
             <a:fld id="{476FB7AA-4A53-424F-AD41-70827B6504BA}" type="datetimeFigureOut">
               <a:rPr lang="en-US" smtClean="0"/>
-              <a:t>9/27/2017</a:t>
+              <a:t>9/28/2017</a:t>
             </a:fld>
             <a:endParaRPr lang="en-US" dirty="0"/>
           </a:p>
@@ -10333,7 +10333,7 @@
           <a:p>
             <a:fld id="{E7884882-FB12-4BC8-9960-9AD8104D7FAE}" type="datetimeFigureOut">
               <a:rPr lang="en-US" smtClean="0"/>
-              <a:t>9/27/2017</a:t>
+              <a:t>9/28/2017</a:t>
             </a:fld>
             <a:endParaRPr lang="en-US" dirty="0"/>
           </a:p>
@@ -10665,7 +10665,7 @@
           <a:p>
             <a:fld id="{F7D1BD23-6E54-4D9D-AD88-A2813C73CC25}" type="datetimeFigureOut">
               <a:rPr lang="en-US" smtClean="0"/>
-              <a:t>9/27/2017</a:t>
+              <a:t>9/28/2017</a:t>
             </a:fld>
             <a:endParaRPr lang="en-US" dirty="0"/>
           </a:p>
@@ -11030,7 +11030,7 @@
           <a:p>
             <a:fld id="{1471A834-4F3C-4AF9-9C74-05EC35A0F292}" type="datetimeFigureOut">
               <a:rPr lang="en-US" smtClean="0"/>
-              <a:t>9/27/2017</a:t>
+              <a:t>9/28/2017</a:t>
             </a:fld>
             <a:endParaRPr lang="en-US" dirty="0"/>
           </a:p>
@@ -11336,7 +11336,7 @@
           <a:p>
             <a:fld id="{51CF1133-3259-4C45-BABA-5B62D9C6F78D}" type="datetimeFigureOut">
               <a:rPr lang="en-US" smtClean="0"/>
-              <a:t>9/27/2017</a:t>
+              <a:t>9/28/2017</a:t>
             </a:fld>
             <a:endParaRPr lang="en-US" dirty="0"/>
           </a:p>
@@ -21206,12 +21206,8 @@
               <a:buChar char="-"/>
             </a:pPr>
             <a:r>
-              <a:rPr lang="es-ES" sz="2400" dirty="0" err="1"/>
-              <a:t>Visualizacion</a:t>
-            </a:r>
-            <a:r>
               <a:rPr lang="es-ES" sz="2400" dirty="0"/>
-              <a:t> de </a:t>
+              <a:t>Visualización de </a:t>
             </a:r>
             <a:r>
               <a:rPr lang="es-ES" sz="2400" dirty="0" err="1"/>

</xml_diff>